<commit_message>
PwC - Digital Intelligence - Task 4 - PowerPoint Presentation continued...
</commit_message>
<xml_diff>
--- a/PWC - Digital Intelligence/Task 4 - Data Analytics Strategy/Task_4_Data_Analytics_Strategy.pptx
+++ b/PWC - Digital Intelligence/Task 4 - Data Analytics Strategy/Task_4_Data_Analytics_Strategy.pptx
@@ -7,6 +7,7 @@
   <p:sldIdLst>
     <p:sldId id="256" r:id="rId2"/>
     <p:sldId id="257" r:id="rId3"/>
+    <p:sldId id="258" r:id="rId4"/>
   </p:sldIdLst>
   <p:sldSz cx="12192000" cy="6858000"/>
   <p:notesSz cx="6858000" cy="9144000"/>
@@ -105,6 +106,11 @@
       </a:defRPr>
     </a:lvl9pPr>
   </p:defaultTextStyle>
+  <p:extLst>
+    <p:ext uri="{EFAFB233-063F-42B5-8137-9DF3F51BA10A}">
+      <p15:sldGuideLst xmlns:p15="http://schemas.microsoft.com/office/powerpoint/2012/main"/>
+    </p:ext>
+  </p:extLst>
 </p:presentation>
 </file>
 
@@ -7816,6 +7822,18 @@
   <p:clrMapOvr>
     <a:masterClrMapping/>
   </p:clrMapOvr>
+  <mc:AlternateContent xmlns:mc="http://schemas.openxmlformats.org/markup-compatibility/2006">
+    <mc:Choice xmlns:p15="http://schemas.microsoft.com/office/powerpoint/2012/main" Requires="p15">
+      <p:transition xmlns:p14="http://schemas.microsoft.com/office/powerpoint/2010/main" spd="slow" p14:dur="1250">
+        <p15:prstTrans prst="pageCurlDouble"/>
+      </p:transition>
+    </mc:Choice>
+    <mc:Fallback>
+      <p:transition spd="slow">
+        <p:fade/>
+      </p:transition>
+    </mc:Fallback>
+  </mc:AlternateContent>
 </p:sld>
 </file>
 
@@ -7913,7 +7931,8 @@
                   <a:srgbClr val="000000"/>
                 </a:solidFill>
                 <a:effectLst/>
-                <a:latin typeface="DM Sans" pitchFamily="2" charset="0"/>
+                <a:latin typeface="Calibri" panose="020F0502020204030204" pitchFamily="34" charset="0"/>
+                <a:cs typeface="Calibri" panose="020F0502020204030204" pitchFamily="34" charset="0"/>
               </a:rPr>
               <a:t>At PwC we develop a data strategy by creating a data vision, defining data reports and analyzing data platform maturity. We develop a group-wide data </a:t>
             </a:r>
@@ -7922,7 +7941,8 @@
                 <a:solidFill>
                   <a:srgbClr val="000000"/>
                 </a:solidFill>
-                <a:latin typeface="DM Sans" pitchFamily="2" charset="0"/>
+                <a:latin typeface="Calibri" panose="020F0502020204030204" pitchFamily="34" charset="0"/>
+                <a:cs typeface="Calibri" panose="020F0502020204030204" pitchFamily="34" charset="0"/>
               </a:rPr>
               <a:t>strategy and enable clients to add value by helping them efficiently analyze their own data, produce reports and create dashboards.</a:t>
             </a:r>
@@ -7933,7 +7953,8 @@
                 <a:solidFill>
                   <a:srgbClr val="000000"/>
                 </a:solidFill>
-                <a:latin typeface="DM Sans" pitchFamily="2" charset="0"/>
+                <a:latin typeface="Calibri" panose="020F0502020204030204" pitchFamily="34" charset="0"/>
+                <a:cs typeface="Calibri" panose="020F0502020204030204" pitchFamily="34" charset="0"/>
               </a:rPr>
               <a:t>As the financial landscape evolves, the client recognizes the significance of harnessing their extensive data assets for strategic decision-making and operational efficiency.</a:t>
             </a:r>
@@ -7944,7 +7965,8 @@
                 <a:solidFill>
                   <a:srgbClr val="000000"/>
                 </a:solidFill>
-                <a:latin typeface="DM Sans" pitchFamily="2" charset="0"/>
+                <a:latin typeface="Calibri" panose="020F0502020204030204" pitchFamily="34" charset="0"/>
+                <a:cs typeface="Calibri" panose="020F0502020204030204" pitchFamily="34" charset="0"/>
               </a:rPr>
               <a:t>This presentation outlines PwC's proposal for building a robust data infrastructure that empowers the client to unlock the full potential of their data resources.</a:t>
             </a:r>
@@ -7961,6 +7983,1971 @@
   <p:clrMapOvr>
     <a:masterClrMapping/>
   </p:clrMapOvr>
+  <mc:AlternateContent xmlns:mc="http://schemas.openxmlformats.org/markup-compatibility/2006">
+    <mc:Choice xmlns:p15="http://schemas.microsoft.com/office/powerpoint/2012/main" Requires="p15">
+      <p:transition xmlns:p14="http://schemas.microsoft.com/office/powerpoint/2010/main" spd="slow" p14:dur="1250">
+        <p15:prstTrans prst="pageCurlDouble"/>
+      </p:transition>
+    </mc:Choice>
+    <mc:Fallback>
+      <p:transition spd="slow">
+        <p:fade/>
+      </p:transition>
+    </mc:Fallback>
+  </mc:AlternateContent>
+  <p:timing>
+    <p:tnLst>
+      <p:par>
+        <p:cTn id="1" dur="indefinite" restart="never" nodeType="tmRoot">
+          <p:childTnLst>
+            <p:seq concurrent="1" nextAc="seek">
+              <p:cTn id="2" dur="indefinite" nodeType="mainSeq">
+                <p:childTnLst>
+                  <p:par>
+                    <p:cTn id="3" fill="hold">
+                      <p:stCondLst>
+                        <p:cond delay="indefinite"/>
+                      </p:stCondLst>
+                      <p:childTnLst>
+                        <p:par>
+                          <p:cTn id="4" fill="hold">
+                            <p:stCondLst>
+                              <p:cond delay="0"/>
+                            </p:stCondLst>
+                            <p:childTnLst>
+                              <p:par>
+                                <p:cTn id="5" presetID="2" presetClass="entr" presetSubtype="4" fill="hold" grpId="0" nodeType="clickEffect">
+                                  <p:stCondLst>
+                                    <p:cond delay="0"/>
+                                  </p:stCondLst>
+                                  <p:childTnLst>
+                                    <p:set>
+                                      <p:cBhvr>
+                                        <p:cTn id="6" dur="1" fill="hold">
+                                          <p:stCondLst>
+                                            <p:cond delay="0"/>
+                                          </p:stCondLst>
+                                        </p:cTn>
+                                        <p:tgtEl>
+                                          <p:spTgt spid="5">
+                                            <p:txEl>
+                                              <p:pRg st="0" end="0"/>
+                                            </p:txEl>
+                                          </p:spTgt>
+                                        </p:tgtEl>
+                                        <p:attrNameLst>
+                                          <p:attrName>style.visibility</p:attrName>
+                                        </p:attrNameLst>
+                                      </p:cBhvr>
+                                      <p:to>
+                                        <p:strVal val="visible"/>
+                                      </p:to>
+                                    </p:set>
+                                    <p:anim calcmode="lin" valueType="num">
+                                      <p:cBhvr additive="base">
+                                        <p:cTn id="7" dur="500" fill="hold"/>
+                                        <p:tgtEl>
+                                          <p:spTgt spid="5">
+                                            <p:txEl>
+                                              <p:pRg st="0" end="0"/>
+                                            </p:txEl>
+                                          </p:spTgt>
+                                        </p:tgtEl>
+                                        <p:attrNameLst>
+                                          <p:attrName>ppt_x</p:attrName>
+                                        </p:attrNameLst>
+                                      </p:cBhvr>
+                                      <p:tavLst>
+                                        <p:tav tm="0">
+                                          <p:val>
+                                            <p:strVal val="#ppt_x"/>
+                                          </p:val>
+                                        </p:tav>
+                                        <p:tav tm="100000">
+                                          <p:val>
+                                            <p:strVal val="#ppt_x"/>
+                                          </p:val>
+                                        </p:tav>
+                                      </p:tavLst>
+                                    </p:anim>
+                                    <p:anim calcmode="lin" valueType="num">
+                                      <p:cBhvr additive="base">
+                                        <p:cTn id="8" dur="500" fill="hold"/>
+                                        <p:tgtEl>
+                                          <p:spTgt spid="5">
+                                            <p:txEl>
+                                              <p:pRg st="0" end="0"/>
+                                            </p:txEl>
+                                          </p:spTgt>
+                                        </p:tgtEl>
+                                        <p:attrNameLst>
+                                          <p:attrName>ppt_y</p:attrName>
+                                        </p:attrNameLst>
+                                      </p:cBhvr>
+                                      <p:tavLst>
+                                        <p:tav tm="0">
+                                          <p:val>
+                                            <p:strVal val="1+#ppt_h/2"/>
+                                          </p:val>
+                                        </p:tav>
+                                        <p:tav tm="100000">
+                                          <p:val>
+                                            <p:strVal val="#ppt_y"/>
+                                          </p:val>
+                                        </p:tav>
+                                      </p:tavLst>
+                                    </p:anim>
+                                  </p:childTnLst>
+                                </p:cTn>
+                              </p:par>
+                            </p:childTnLst>
+                          </p:cTn>
+                        </p:par>
+                      </p:childTnLst>
+                    </p:cTn>
+                  </p:par>
+                  <p:par>
+                    <p:cTn id="9" fill="hold">
+                      <p:stCondLst>
+                        <p:cond delay="indefinite"/>
+                      </p:stCondLst>
+                      <p:childTnLst>
+                        <p:par>
+                          <p:cTn id="10" fill="hold">
+                            <p:stCondLst>
+                              <p:cond delay="0"/>
+                            </p:stCondLst>
+                            <p:childTnLst>
+                              <p:par>
+                                <p:cTn id="11" presetID="2" presetClass="entr" presetSubtype="4" fill="hold" grpId="0" nodeType="clickEffect">
+                                  <p:stCondLst>
+                                    <p:cond delay="0"/>
+                                  </p:stCondLst>
+                                  <p:childTnLst>
+                                    <p:set>
+                                      <p:cBhvr>
+                                        <p:cTn id="12" dur="1" fill="hold">
+                                          <p:stCondLst>
+                                            <p:cond delay="0"/>
+                                          </p:stCondLst>
+                                        </p:cTn>
+                                        <p:tgtEl>
+                                          <p:spTgt spid="5">
+                                            <p:txEl>
+                                              <p:pRg st="1" end="1"/>
+                                            </p:txEl>
+                                          </p:spTgt>
+                                        </p:tgtEl>
+                                        <p:attrNameLst>
+                                          <p:attrName>style.visibility</p:attrName>
+                                        </p:attrNameLst>
+                                      </p:cBhvr>
+                                      <p:to>
+                                        <p:strVal val="visible"/>
+                                      </p:to>
+                                    </p:set>
+                                    <p:anim calcmode="lin" valueType="num">
+                                      <p:cBhvr additive="base">
+                                        <p:cTn id="13" dur="500" fill="hold"/>
+                                        <p:tgtEl>
+                                          <p:spTgt spid="5">
+                                            <p:txEl>
+                                              <p:pRg st="1" end="1"/>
+                                            </p:txEl>
+                                          </p:spTgt>
+                                        </p:tgtEl>
+                                        <p:attrNameLst>
+                                          <p:attrName>ppt_x</p:attrName>
+                                        </p:attrNameLst>
+                                      </p:cBhvr>
+                                      <p:tavLst>
+                                        <p:tav tm="0">
+                                          <p:val>
+                                            <p:strVal val="#ppt_x"/>
+                                          </p:val>
+                                        </p:tav>
+                                        <p:tav tm="100000">
+                                          <p:val>
+                                            <p:strVal val="#ppt_x"/>
+                                          </p:val>
+                                        </p:tav>
+                                      </p:tavLst>
+                                    </p:anim>
+                                    <p:anim calcmode="lin" valueType="num">
+                                      <p:cBhvr additive="base">
+                                        <p:cTn id="14" dur="500" fill="hold"/>
+                                        <p:tgtEl>
+                                          <p:spTgt spid="5">
+                                            <p:txEl>
+                                              <p:pRg st="1" end="1"/>
+                                            </p:txEl>
+                                          </p:spTgt>
+                                        </p:tgtEl>
+                                        <p:attrNameLst>
+                                          <p:attrName>ppt_y</p:attrName>
+                                        </p:attrNameLst>
+                                      </p:cBhvr>
+                                      <p:tavLst>
+                                        <p:tav tm="0">
+                                          <p:val>
+                                            <p:strVal val="1+#ppt_h/2"/>
+                                          </p:val>
+                                        </p:tav>
+                                        <p:tav tm="100000">
+                                          <p:val>
+                                            <p:strVal val="#ppt_y"/>
+                                          </p:val>
+                                        </p:tav>
+                                      </p:tavLst>
+                                    </p:anim>
+                                  </p:childTnLst>
+                                </p:cTn>
+                              </p:par>
+                            </p:childTnLst>
+                          </p:cTn>
+                        </p:par>
+                      </p:childTnLst>
+                    </p:cTn>
+                  </p:par>
+                  <p:par>
+                    <p:cTn id="15" fill="hold">
+                      <p:stCondLst>
+                        <p:cond delay="indefinite"/>
+                      </p:stCondLst>
+                      <p:childTnLst>
+                        <p:par>
+                          <p:cTn id="16" fill="hold">
+                            <p:stCondLst>
+                              <p:cond delay="0"/>
+                            </p:stCondLst>
+                            <p:childTnLst>
+                              <p:par>
+                                <p:cTn id="17" presetID="2" presetClass="entr" presetSubtype="4" fill="hold" grpId="0" nodeType="clickEffect">
+                                  <p:stCondLst>
+                                    <p:cond delay="0"/>
+                                  </p:stCondLst>
+                                  <p:childTnLst>
+                                    <p:set>
+                                      <p:cBhvr>
+                                        <p:cTn id="18" dur="1" fill="hold">
+                                          <p:stCondLst>
+                                            <p:cond delay="0"/>
+                                          </p:stCondLst>
+                                        </p:cTn>
+                                        <p:tgtEl>
+                                          <p:spTgt spid="5">
+                                            <p:txEl>
+                                              <p:pRg st="2" end="2"/>
+                                            </p:txEl>
+                                          </p:spTgt>
+                                        </p:tgtEl>
+                                        <p:attrNameLst>
+                                          <p:attrName>style.visibility</p:attrName>
+                                        </p:attrNameLst>
+                                      </p:cBhvr>
+                                      <p:to>
+                                        <p:strVal val="visible"/>
+                                      </p:to>
+                                    </p:set>
+                                    <p:anim calcmode="lin" valueType="num">
+                                      <p:cBhvr additive="base">
+                                        <p:cTn id="19" dur="500" fill="hold"/>
+                                        <p:tgtEl>
+                                          <p:spTgt spid="5">
+                                            <p:txEl>
+                                              <p:pRg st="2" end="2"/>
+                                            </p:txEl>
+                                          </p:spTgt>
+                                        </p:tgtEl>
+                                        <p:attrNameLst>
+                                          <p:attrName>ppt_x</p:attrName>
+                                        </p:attrNameLst>
+                                      </p:cBhvr>
+                                      <p:tavLst>
+                                        <p:tav tm="0">
+                                          <p:val>
+                                            <p:strVal val="#ppt_x"/>
+                                          </p:val>
+                                        </p:tav>
+                                        <p:tav tm="100000">
+                                          <p:val>
+                                            <p:strVal val="#ppt_x"/>
+                                          </p:val>
+                                        </p:tav>
+                                      </p:tavLst>
+                                    </p:anim>
+                                    <p:anim calcmode="lin" valueType="num">
+                                      <p:cBhvr additive="base">
+                                        <p:cTn id="20" dur="500" fill="hold"/>
+                                        <p:tgtEl>
+                                          <p:spTgt spid="5">
+                                            <p:txEl>
+                                              <p:pRg st="2" end="2"/>
+                                            </p:txEl>
+                                          </p:spTgt>
+                                        </p:tgtEl>
+                                        <p:attrNameLst>
+                                          <p:attrName>ppt_y</p:attrName>
+                                        </p:attrNameLst>
+                                      </p:cBhvr>
+                                      <p:tavLst>
+                                        <p:tav tm="0">
+                                          <p:val>
+                                            <p:strVal val="1+#ppt_h/2"/>
+                                          </p:val>
+                                        </p:tav>
+                                        <p:tav tm="100000">
+                                          <p:val>
+                                            <p:strVal val="#ppt_y"/>
+                                          </p:val>
+                                        </p:tav>
+                                      </p:tavLst>
+                                    </p:anim>
+                                  </p:childTnLst>
+                                </p:cTn>
+                              </p:par>
+                            </p:childTnLst>
+                          </p:cTn>
+                        </p:par>
+                      </p:childTnLst>
+                    </p:cTn>
+                  </p:par>
+                </p:childTnLst>
+              </p:cTn>
+              <p:prevCondLst>
+                <p:cond evt="onPrev" delay="0">
+                  <p:tgtEl>
+                    <p:sldTgt/>
+                  </p:tgtEl>
+                </p:cond>
+              </p:prevCondLst>
+              <p:nextCondLst>
+                <p:cond evt="onNext" delay="0">
+                  <p:tgtEl>
+                    <p:sldTgt/>
+                  </p:tgtEl>
+                </p:cond>
+              </p:nextCondLst>
+            </p:seq>
+          </p:childTnLst>
+        </p:cTn>
+      </p:par>
+    </p:tnLst>
+    <p:bldLst>
+      <p:bldP spid="5" grpId="0" build="p"/>
+    </p:bldLst>
+  </p:timing>
+</p:sld>
+</file>
+
+<file path=ppt/slides/slide3.xml><?xml version="1.0" encoding="utf-8"?>
+<p:sld xmlns:a="http://schemas.openxmlformats.org/drawingml/2006/main" xmlns:r="http://schemas.openxmlformats.org/officeDocument/2006/relationships" xmlns:p="http://schemas.openxmlformats.org/presentationml/2006/main">
+  <p:cSld>
+    <p:bg>
+      <p:bgPr>
+        <a:solidFill>
+          <a:schemeClr val="accent6">
+            <a:lumMod val="40000"/>
+            <a:lumOff val="60000"/>
+            <a:alpha val="75000"/>
+          </a:schemeClr>
+        </a:solidFill>
+        <a:effectLst/>
+      </p:bgPr>
+    </p:bg>
+    <p:spTree>
+      <p:nvGrpSpPr>
+        <p:cNvPr id="1" name=""/>
+        <p:cNvGrpSpPr/>
+        <p:nvPr/>
+      </p:nvGrpSpPr>
+      <p:grpSpPr>
+        <a:xfrm>
+          <a:off x="0" y="0"/>
+          <a:ext cx="0" cy="0"/>
+          <a:chOff x="0" y="0"/>
+          <a:chExt cx="0" cy="0"/>
+        </a:xfrm>
+      </p:grpSpPr>
+      <p:sp>
+        <p:nvSpPr>
+          <p:cNvPr id="4" name="Title 3">
+            <a:extLst>
+              <a:ext uri="{FF2B5EF4-FFF2-40B4-BE49-F238E27FC236}">
+                <a16:creationId xmlns:a16="http://schemas.microsoft.com/office/drawing/2014/main" id="{22C1F510-134D-7DE1-73D5-F1059BB70482}"/>
+              </a:ext>
+            </a:extLst>
+          </p:cNvPr>
+          <p:cNvSpPr>
+            <a:spLocks noGrp="1"/>
+          </p:cNvSpPr>
+          <p:nvPr>
+            <p:ph type="title"/>
+          </p:nvPr>
+        </p:nvSpPr>
+        <p:spPr>
+          <a:xfrm>
+            <a:off x="2592925" y="624110"/>
+            <a:ext cx="8911687" cy="776673"/>
+          </a:xfrm>
+        </p:spPr>
+        <p:txBody>
+          <a:bodyPr anchor="ctr">
+            <a:normAutofit/>
+          </a:bodyPr>
+          <a:lstStyle/>
+          <a:p>
+            <a:pPr algn="ctr"/>
+            <a:r>
+              <a:rPr lang="en-US" sz="3200" dirty="0">
+                <a:latin typeface="Arial Black" panose="020B0A04020102020204" pitchFamily="34" charset="0"/>
+              </a:rPr>
+              <a:t>Key Questions</a:t>
+            </a:r>
+          </a:p>
+        </p:txBody>
+      </p:sp>
+      <p:sp>
+        <p:nvSpPr>
+          <p:cNvPr id="5" name="Content Placeholder 4">
+            <a:extLst>
+              <a:ext uri="{FF2B5EF4-FFF2-40B4-BE49-F238E27FC236}">
+                <a16:creationId xmlns:a16="http://schemas.microsoft.com/office/drawing/2014/main" id="{FBDD2FE2-B5C6-53D5-DD8A-3476C868886C}"/>
+              </a:ext>
+            </a:extLst>
+          </p:cNvPr>
+          <p:cNvSpPr>
+            <a:spLocks noGrp="1"/>
+          </p:cNvSpPr>
+          <p:nvPr>
+            <p:ph idx="1"/>
+          </p:nvPr>
+        </p:nvSpPr>
+        <p:spPr>
+          <a:xfrm>
+            <a:off x="2592925" y="1657738"/>
+            <a:ext cx="8915400" cy="4444482"/>
+          </a:xfrm>
+        </p:spPr>
+        <p:txBody>
+          <a:bodyPr>
+            <a:normAutofit fontScale="92500" lnSpcReduction="20000"/>
+          </a:bodyPr>
+          <a:lstStyle/>
+          <a:p>
+            <a:r>
+              <a:rPr lang="en-US" sz="1900" b="1" dirty="0">
+                <a:solidFill>
+                  <a:schemeClr val="tx1"/>
+                </a:solidFill>
+                <a:latin typeface="Calibri" panose="020F0502020204030204" pitchFamily="34" charset="0"/>
+                <a:cs typeface="Calibri" panose="020F0502020204030204" pitchFamily="34" charset="0"/>
+              </a:rPr>
+              <a:t>Data Sources: </a:t>
+            </a:r>
+          </a:p>
+          <a:p>
+            <a:pPr>
+              <a:buFont typeface="+mj-lt"/>
+              <a:buAutoNum type="arabicPeriod"/>
+            </a:pPr>
+            <a:r>
+              <a:rPr lang="en-US" sz="1600" dirty="0">
+                <a:solidFill>
+                  <a:schemeClr val="tx1"/>
+                </a:solidFill>
+                <a:latin typeface="Calibri" panose="020F0502020204030204" pitchFamily="34" charset="0"/>
+                <a:cs typeface="Calibri" panose="020F0502020204030204" pitchFamily="34" charset="0"/>
+              </a:rPr>
+              <a:t>Can you provide an overview of the existing data sources within the organization?</a:t>
+            </a:r>
+          </a:p>
+          <a:p>
+            <a:pPr>
+              <a:buFont typeface="+mj-lt"/>
+              <a:buAutoNum type="arabicPeriod"/>
+            </a:pPr>
+            <a:r>
+              <a:rPr lang="en-US" sz="1600" dirty="0">
+                <a:solidFill>
+                  <a:schemeClr val="tx1"/>
+                </a:solidFill>
+                <a:latin typeface="Calibri" panose="020F0502020204030204" pitchFamily="34" charset="0"/>
+                <a:cs typeface="Calibri" panose="020F0502020204030204" pitchFamily="34" charset="0"/>
+              </a:rPr>
+              <a:t>Which departments generate the most critical data?</a:t>
+            </a:r>
+          </a:p>
+          <a:p>
+            <a:pPr marL="0" indent="0">
+              <a:buNone/>
+            </a:pPr>
+            <a:r>
+              <a:rPr lang="en-US" sz="1500" b="1" dirty="0">
+                <a:solidFill>
+                  <a:schemeClr val="tx1"/>
+                </a:solidFill>
+                <a:latin typeface="Calibri" panose="020F0502020204030204" pitchFamily="34" charset="0"/>
+                <a:cs typeface="Calibri" panose="020F0502020204030204" pitchFamily="34" charset="0"/>
+              </a:rPr>
+              <a:t>Importance: </a:t>
+            </a:r>
+            <a:r>
+              <a:rPr lang="en-US" sz="1500" dirty="0">
+                <a:solidFill>
+                  <a:schemeClr val="tx1"/>
+                </a:solidFill>
+                <a:latin typeface="Calibri" panose="020F0502020204030204" pitchFamily="34" charset="0"/>
+                <a:cs typeface="Calibri" panose="020F0502020204030204" pitchFamily="34" charset="0"/>
+              </a:rPr>
+              <a:t>Understanding the various data sources is fundamental for designing an effective data infrastructure. It helps identify the diversity of data and the potential complexity in integration.</a:t>
+            </a:r>
+            <a:endParaRPr lang="en-US" sz="1500" b="1" dirty="0">
+              <a:solidFill>
+                <a:schemeClr val="tx1"/>
+              </a:solidFill>
+              <a:latin typeface="Calibri" panose="020F0502020204030204" pitchFamily="34" charset="0"/>
+              <a:cs typeface="Calibri" panose="020F0502020204030204" pitchFamily="34" charset="0"/>
+            </a:endParaRPr>
+          </a:p>
+          <a:p>
+            <a:r>
+              <a:rPr lang="en-US" sz="1700" b="1" dirty="0">
+                <a:solidFill>
+                  <a:schemeClr val="tx1"/>
+                </a:solidFill>
+                <a:latin typeface="Calibri" panose="020F0502020204030204" pitchFamily="34" charset="0"/>
+                <a:cs typeface="Calibri" panose="020F0502020204030204" pitchFamily="34" charset="0"/>
+              </a:rPr>
+              <a:t>Data Quality:</a:t>
+            </a:r>
+          </a:p>
+          <a:p>
+            <a:pPr>
+              <a:buFont typeface="+mj-lt"/>
+              <a:buAutoNum type="arabicPeriod"/>
+            </a:pPr>
+            <a:r>
+              <a:rPr lang="en-US" sz="1600" dirty="0">
+                <a:solidFill>
+                  <a:schemeClr val="tx1"/>
+                </a:solidFill>
+                <a:latin typeface="Calibri" panose="020F0502020204030204" pitchFamily="34" charset="0"/>
+                <a:cs typeface="Calibri" panose="020F0502020204030204" pitchFamily="34" charset="0"/>
+              </a:rPr>
+              <a:t>How confident are you in the accuracy and completeness of your data?</a:t>
+            </a:r>
+          </a:p>
+          <a:p>
+            <a:pPr>
+              <a:buFont typeface="+mj-lt"/>
+              <a:buAutoNum type="arabicPeriod"/>
+            </a:pPr>
+            <a:r>
+              <a:rPr lang="en-US" sz="1600" dirty="0">
+                <a:solidFill>
+                  <a:schemeClr val="tx1"/>
+                </a:solidFill>
+                <a:latin typeface="Calibri" panose="020F0502020204030204" pitchFamily="34" charset="0"/>
+                <a:cs typeface="Calibri" panose="020F0502020204030204" pitchFamily="34" charset="0"/>
+              </a:rPr>
+              <a:t>Are there any specific data quality concerns we should address?</a:t>
+            </a:r>
+          </a:p>
+          <a:p>
+            <a:pPr marL="0" indent="0">
+              <a:buNone/>
+            </a:pPr>
+            <a:r>
+              <a:rPr lang="en-US" sz="1500" b="1" dirty="0">
+                <a:solidFill>
+                  <a:schemeClr val="tx1"/>
+                </a:solidFill>
+                <a:latin typeface="Calibri" panose="020F0502020204030204" pitchFamily="34" charset="0"/>
+                <a:cs typeface="Calibri" panose="020F0502020204030204" pitchFamily="34" charset="0"/>
+              </a:rPr>
+              <a:t>Importance: </a:t>
+            </a:r>
+            <a:r>
+              <a:rPr lang="en-US" sz="1500" dirty="0">
+                <a:solidFill>
+                  <a:schemeClr val="tx1"/>
+                </a:solidFill>
+                <a:latin typeface="Calibri" panose="020F0502020204030204" pitchFamily="34" charset="0"/>
+                <a:cs typeface="Calibri" panose="020F0502020204030204" pitchFamily="34" charset="0"/>
+              </a:rPr>
+              <a:t>Data quality is paramount for reliable analytics and decision-making. Identifying data quality concerns upfront ensures that the proposed solution addresses potential issues, enhancing trust in the data.</a:t>
+            </a:r>
+          </a:p>
+          <a:p>
+            <a:r>
+              <a:rPr lang="en-US" sz="1700" b="1" dirty="0">
+                <a:solidFill>
+                  <a:schemeClr val="tx1"/>
+                </a:solidFill>
+                <a:latin typeface="Calibri" panose="020F0502020204030204" pitchFamily="34" charset="0"/>
+                <a:cs typeface="Calibri" panose="020F0502020204030204" pitchFamily="34" charset="0"/>
+              </a:rPr>
+              <a:t>Data Usage:</a:t>
+            </a:r>
+          </a:p>
+          <a:p>
+            <a:pPr>
+              <a:buFont typeface="+mj-lt"/>
+              <a:buAutoNum type="arabicPeriod"/>
+            </a:pPr>
+            <a:r>
+              <a:rPr lang="en-US" sz="1600" dirty="0">
+                <a:solidFill>
+                  <a:schemeClr val="tx1"/>
+                </a:solidFill>
+                <a:latin typeface="Calibri" panose="020F0502020204030204" pitchFamily="34" charset="0"/>
+                <a:cs typeface="Calibri" panose="020F0502020204030204" pitchFamily="34" charset="0"/>
+              </a:rPr>
+              <a:t>What are the primary use cases for your data?</a:t>
+            </a:r>
+          </a:p>
+          <a:p>
+            <a:pPr>
+              <a:buFont typeface="+mj-lt"/>
+              <a:buAutoNum type="arabicPeriod"/>
+            </a:pPr>
+            <a:r>
+              <a:rPr lang="en-US" sz="1600" dirty="0">
+                <a:solidFill>
+                  <a:schemeClr val="tx1"/>
+                </a:solidFill>
+                <a:latin typeface="Calibri" panose="020F0502020204030204" pitchFamily="34" charset="0"/>
+                <a:cs typeface="Calibri" panose="020F0502020204030204" pitchFamily="34" charset="0"/>
+              </a:rPr>
+              <a:t>How is data currently utilized for decision-making?</a:t>
+            </a:r>
+          </a:p>
+          <a:p>
+            <a:pPr marL="0" indent="0">
+              <a:buNone/>
+            </a:pPr>
+            <a:r>
+              <a:rPr lang="en-US" sz="1500" b="1" dirty="0">
+                <a:solidFill>
+                  <a:schemeClr val="tx1"/>
+                </a:solidFill>
+                <a:latin typeface="Calibri" panose="020F0502020204030204" pitchFamily="34" charset="0"/>
+                <a:cs typeface="Calibri" panose="020F0502020204030204" pitchFamily="34" charset="0"/>
+              </a:rPr>
+              <a:t>Importance: </a:t>
+            </a:r>
+            <a:r>
+              <a:rPr lang="en-US" sz="1500" dirty="0">
+                <a:solidFill>
+                  <a:schemeClr val="tx1"/>
+                </a:solidFill>
+                <a:latin typeface="Calibri" panose="020F0502020204030204" pitchFamily="34" charset="0"/>
+                <a:cs typeface="Calibri" panose="020F0502020204030204" pitchFamily="34" charset="0"/>
+              </a:rPr>
+              <a:t>Knowing how data is currently used provides insights into the specific requirements for analytics, reporting, and decision-making. It guides the design of the infrastructure to meet these specific use cases.</a:t>
+            </a:r>
+            <a:endParaRPr lang="en-US" sz="1500" b="1" dirty="0">
+              <a:solidFill>
+                <a:schemeClr val="tx1"/>
+              </a:solidFill>
+              <a:latin typeface="Calibri" panose="020F0502020204030204" pitchFamily="34" charset="0"/>
+              <a:cs typeface="Calibri" panose="020F0502020204030204" pitchFamily="34" charset="0"/>
+            </a:endParaRPr>
+          </a:p>
+        </p:txBody>
+      </p:sp>
+    </p:spTree>
+    <p:extLst>
+      <p:ext uri="{BB962C8B-B14F-4D97-AF65-F5344CB8AC3E}">
+        <p14:creationId xmlns:p14="http://schemas.microsoft.com/office/powerpoint/2010/main" val="224879084"/>
+      </p:ext>
+    </p:extLst>
+  </p:cSld>
+  <p:clrMapOvr>
+    <a:masterClrMapping/>
+  </p:clrMapOvr>
+  <mc:AlternateContent xmlns:mc="http://schemas.openxmlformats.org/markup-compatibility/2006">
+    <mc:Choice xmlns:p15="http://schemas.microsoft.com/office/powerpoint/2012/main" Requires="p15">
+      <p:transition xmlns:p14="http://schemas.microsoft.com/office/powerpoint/2010/main" spd="slow" p14:dur="1250">
+        <p15:prstTrans prst="pageCurlDouble"/>
+      </p:transition>
+    </mc:Choice>
+    <mc:Fallback>
+      <p:transition spd="slow">
+        <p:fade/>
+      </p:transition>
+    </mc:Fallback>
+  </mc:AlternateContent>
+  <p:timing>
+    <p:tnLst>
+      <p:par>
+        <p:cTn id="1" dur="indefinite" restart="never" nodeType="tmRoot">
+          <p:childTnLst>
+            <p:seq concurrent="1" nextAc="seek">
+              <p:cTn id="2" dur="indefinite" nodeType="mainSeq">
+                <p:childTnLst>
+                  <p:par>
+                    <p:cTn id="3" fill="hold">
+                      <p:stCondLst>
+                        <p:cond delay="indefinite"/>
+                      </p:stCondLst>
+                      <p:childTnLst>
+                        <p:par>
+                          <p:cTn id="4" fill="hold">
+                            <p:stCondLst>
+                              <p:cond delay="0"/>
+                            </p:stCondLst>
+                            <p:childTnLst>
+                              <p:par>
+                                <p:cTn id="5" presetID="2" presetClass="entr" presetSubtype="4" fill="hold" grpId="0" nodeType="clickEffect">
+                                  <p:stCondLst>
+                                    <p:cond delay="0"/>
+                                  </p:stCondLst>
+                                  <p:childTnLst>
+                                    <p:set>
+                                      <p:cBhvr>
+                                        <p:cTn id="6" dur="1" fill="hold">
+                                          <p:stCondLst>
+                                            <p:cond delay="0"/>
+                                          </p:stCondLst>
+                                        </p:cTn>
+                                        <p:tgtEl>
+                                          <p:spTgt spid="5">
+                                            <p:txEl>
+                                              <p:pRg st="0" end="0"/>
+                                            </p:txEl>
+                                          </p:spTgt>
+                                        </p:tgtEl>
+                                        <p:attrNameLst>
+                                          <p:attrName>style.visibility</p:attrName>
+                                        </p:attrNameLst>
+                                      </p:cBhvr>
+                                      <p:to>
+                                        <p:strVal val="visible"/>
+                                      </p:to>
+                                    </p:set>
+                                    <p:anim calcmode="lin" valueType="num">
+                                      <p:cBhvr additive="base">
+                                        <p:cTn id="7" dur="500" fill="hold"/>
+                                        <p:tgtEl>
+                                          <p:spTgt spid="5">
+                                            <p:txEl>
+                                              <p:pRg st="0" end="0"/>
+                                            </p:txEl>
+                                          </p:spTgt>
+                                        </p:tgtEl>
+                                        <p:attrNameLst>
+                                          <p:attrName>ppt_x</p:attrName>
+                                        </p:attrNameLst>
+                                      </p:cBhvr>
+                                      <p:tavLst>
+                                        <p:tav tm="0">
+                                          <p:val>
+                                            <p:strVal val="#ppt_x"/>
+                                          </p:val>
+                                        </p:tav>
+                                        <p:tav tm="100000">
+                                          <p:val>
+                                            <p:strVal val="#ppt_x"/>
+                                          </p:val>
+                                        </p:tav>
+                                      </p:tavLst>
+                                    </p:anim>
+                                    <p:anim calcmode="lin" valueType="num">
+                                      <p:cBhvr additive="base">
+                                        <p:cTn id="8" dur="500" fill="hold"/>
+                                        <p:tgtEl>
+                                          <p:spTgt spid="5">
+                                            <p:txEl>
+                                              <p:pRg st="0" end="0"/>
+                                            </p:txEl>
+                                          </p:spTgt>
+                                        </p:tgtEl>
+                                        <p:attrNameLst>
+                                          <p:attrName>ppt_y</p:attrName>
+                                        </p:attrNameLst>
+                                      </p:cBhvr>
+                                      <p:tavLst>
+                                        <p:tav tm="0">
+                                          <p:val>
+                                            <p:strVal val="1+#ppt_h/2"/>
+                                          </p:val>
+                                        </p:tav>
+                                        <p:tav tm="100000">
+                                          <p:val>
+                                            <p:strVal val="#ppt_y"/>
+                                          </p:val>
+                                        </p:tav>
+                                      </p:tavLst>
+                                    </p:anim>
+                                  </p:childTnLst>
+                                </p:cTn>
+                              </p:par>
+                            </p:childTnLst>
+                          </p:cTn>
+                        </p:par>
+                      </p:childTnLst>
+                    </p:cTn>
+                  </p:par>
+                  <p:par>
+                    <p:cTn id="9" fill="hold">
+                      <p:stCondLst>
+                        <p:cond delay="indefinite"/>
+                      </p:stCondLst>
+                      <p:childTnLst>
+                        <p:par>
+                          <p:cTn id="10" fill="hold">
+                            <p:stCondLst>
+                              <p:cond delay="0"/>
+                            </p:stCondLst>
+                            <p:childTnLst>
+                              <p:par>
+                                <p:cTn id="11" presetID="2" presetClass="entr" presetSubtype="4" fill="hold" grpId="0" nodeType="clickEffect">
+                                  <p:stCondLst>
+                                    <p:cond delay="0"/>
+                                  </p:stCondLst>
+                                  <p:childTnLst>
+                                    <p:set>
+                                      <p:cBhvr>
+                                        <p:cTn id="12" dur="1" fill="hold">
+                                          <p:stCondLst>
+                                            <p:cond delay="0"/>
+                                          </p:stCondLst>
+                                        </p:cTn>
+                                        <p:tgtEl>
+                                          <p:spTgt spid="5">
+                                            <p:txEl>
+                                              <p:pRg st="1" end="1"/>
+                                            </p:txEl>
+                                          </p:spTgt>
+                                        </p:tgtEl>
+                                        <p:attrNameLst>
+                                          <p:attrName>style.visibility</p:attrName>
+                                        </p:attrNameLst>
+                                      </p:cBhvr>
+                                      <p:to>
+                                        <p:strVal val="visible"/>
+                                      </p:to>
+                                    </p:set>
+                                    <p:anim calcmode="lin" valueType="num">
+                                      <p:cBhvr additive="base">
+                                        <p:cTn id="13" dur="500" fill="hold"/>
+                                        <p:tgtEl>
+                                          <p:spTgt spid="5">
+                                            <p:txEl>
+                                              <p:pRg st="1" end="1"/>
+                                            </p:txEl>
+                                          </p:spTgt>
+                                        </p:tgtEl>
+                                        <p:attrNameLst>
+                                          <p:attrName>ppt_x</p:attrName>
+                                        </p:attrNameLst>
+                                      </p:cBhvr>
+                                      <p:tavLst>
+                                        <p:tav tm="0">
+                                          <p:val>
+                                            <p:strVal val="#ppt_x"/>
+                                          </p:val>
+                                        </p:tav>
+                                        <p:tav tm="100000">
+                                          <p:val>
+                                            <p:strVal val="#ppt_x"/>
+                                          </p:val>
+                                        </p:tav>
+                                      </p:tavLst>
+                                    </p:anim>
+                                    <p:anim calcmode="lin" valueType="num">
+                                      <p:cBhvr additive="base">
+                                        <p:cTn id="14" dur="500" fill="hold"/>
+                                        <p:tgtEl>
+                                          <p:spTgt spid="5">
+                                            <p:txEl>
+                                              <p:pRg st="1" end="1"/>
+                                            </p:txEl>
+                                          </p:spTgt>
+                                        </p:tgtEl>
+                                        <p:attrNameLst>
+                                          <p:attrName>ppt_y</p:attrName>
+                                        </p:attrNameLst>
+                                      </p:cBhvr>
+                                      <p:tavLst>
+                                        <p:tav tm="0">
+                                          <p:val>
+                                            <p:strVal val="1+#ppt_h/2"/>
+                                          </p:val>
+                                        </p:tav>
+                                        <p:tav tm="100000">
+                                          <p:val>
+                                            <p:strVal val="#ppt_y"/>
+                                          </p:val>
+                                        </p:tav>
+                                      </p:tavLst>
+                                    </p:anim>
+                                  </p:childTnLst>
+                                </p:cTn>
+                              </p:par>
+                            </p:childTnLst>
+                          </p:cTn>
+                        </p:par>
+                      </p:childTnLst>
+                    </p:cTn>
+                  </p:par>
+                  <p:par>
+                    <p:cTn id="15" fill="hold">
+                      <p:stCondLst>
+                        <p:cond delay="indefinite"/>
+                      </p:stCondLst>
+                      <p:childTnLst>
+                        <p:par>
+                          <p:cTn id="16" fill="hold">
+                            <p:stCondLst>
+                              <p:cond delay="0"/>
+                            </p:stCondLst>
+                            <p:childTnLst>
+                              <p:par>
+                                <p:cTn id="17" presetID="2" presetClass="entr" presetSubtype="4" fill="hold" grpId="0" nodeType="clickEffect">
+                                  <p:stCondLst>
+                                    <p:cond delay="0"/>
+                                  </p:stCondLst>
+                                  <p:childTnLst>
+                                    <p:set>
+                                      <p:cBhvr>
+                                        <p:cTn id="18" dur="1" fill="hold">
+                                          <p:stCondLst>
+                                            <p:cond delay="0"/>
+                                          </p:stCondLst>
+                                        </p:cTn>
+                                        <p:tgtEl>
+                                          <p:spTgt spid="5">
+                                            <p:txEl>
+                                              <p:pRg st="2" end="2"/>
+                                            </p:txEl>
+                                          </p:spTgt>
+                                        </p:tgtEl>
+                                        <p:attrNameLst>
+                                          <p:attrName>style.visibility</p:attrName>
+                                        </p:attrNameLst>
+                                      </p:cBhvr>
+                                      <p:to>
+                                        <p:strVal val="visible"/>
+                                      </p:to>
+                                    </p:set>
+                                    <p:anim calcmode="lin" valueType="num">
+                                      <p:cBhvr additive="base">
+                                        <p:cTn id="19" dur="500" fill="hold"/>
+                                        <p:tgtEl>
+                                          <p:spTgt spid="5">
+                                            <p:txEl>
+                                              <p:pRg st="2" end="2"/>
+                                            </p:txEl>
+                                          </p:spTgt>
+                                        </p:tgtEl>
+                                        <p:attrNameLst>
+                                          <p:attrName>ppt_x</p:attrName>
+                                        </p:attrNameLst>
+                                      </p:cBhvr>
+                                      <p:tavLst>
+                                        <p:tav tm="0">
+                                          <p:val>
+                                            <p:strVal val="#ppt_x"/>
+                                          </p:val>
+                                        </p:tav>
+                                        <p:tav tm="100000">
+                                          <p:val>
+                                            <p:strVal val="#ppt_x"/>
+                                          </p:val>
+                                        </p:tav>
+                                      </p:tavLst>
+                                    </p:anim>
+                                    <p:anim calcmode="lin" valueType="num">
+                                      <p:cBhvr additive="base">
+                                        <p:cTn id="20" dur="500" fill="hold"/>
+                                        <p:tgtEl>
+                                          <p:spTgt spid="5">
+                                            <p:txEl>
+                                              <p:pRg st="2" end="2"/>
+                                            </p:txEl>
+                                          </p:spTgt>
+                                        </p:tgtEl>
+                                        <p:attrNameLst>
+                                          <p:attrName>ppt_y</p:attrName>
+                                        </p:attrNameLst>
+                                      </p:cBhvr>
+                                      <p:tavLst>
+                                        <p:tav tm="0">
+                                          <p:val>
+                                            <p:strVal val="1+#ppt_h/2"/>
+                                          </p:val>
+                                        </p:tav>
+                                        <p:tav tm="100000">
+                                          <p:val>
+                                            <p:strVal val="#ppt_y"/>
+                                          </p:val>
+                                        </p:tav>
+                                      </p:tavLst>
+                                    </p:anim>
+                                  </p:childTnLst>
+                                </p:cTn>
+                              </p:par>
+                            </p:childTnLst>
+                          </p:cTn>
+                        </p:par>
+                      </p:childTnLst>
+                    </p:cTn>
+                  </p:par>
+                  <p:par>
+                    <p:cTn id="21" fill="hold">
+                      <p:stCondLst>
+                        <p:cond delay="indefinite"/>
+                      </p:stCondLst>
+                      <p:childTnLst>
+                        <p:par>
+                          <p:cTn id="22" fill="hold">
+                            <p:stCondLst>
+                              <p:cond delay="0"/>
+                            </p:stCondLst>
+                            <p:childTnLst>
+                              <p:par>
+                                <p:cTn id="23" presetID="2" presetClass="entr" presetSubtype="4" fill="hold" grpId="0" nodeType="clickEffect">
+                                  <p:stCondLst>
+                                    <p:cond delay="0"/>
+                                  </p:stCondLst>
+                                  <p:childTnLst>
+                                    <p:set>
+                                      <p:cBhvr>
+                                        <p:cTn id="24" dur="1" fill="hold">
+                                          <p:stCondLst>
+                                            <p:cond delay="0"/>
+                                          </p:stCondLst>
+                                        </p:cTn>
+                                        <p:tgtEl>
+                                          <p:spTgt spid="5">
+                                            <p:txEl>
+                                              <p:pRg st="3" end="3"/>
+                                            </p:txEl>
+                                          </p:spTgt>
+                                        </p:tgtEl>
+                                        <p:attrNameLst>
+                                          <p:attrName>style.visibility</p:attrName>
+                                        </p:attrNameLst>
+                                      </p:cBhvr>
+                                      <p:to>
+                                        <p:strVal val="visible"/>
+                                      </p:to>
+                                    </p:set>
+                                    <p:anim calcmode="lin" valueType="num">
+                                      <p:cBhvr additive="base">
+                                        <p:cTn id="25" dur="500" fill="hold"/>
+                                        <p:tgtEl>
+                                          <p:spTgt spid="5">
+                                            <p:txEl>
+                                              <p:pRg st="3" end="3"/>
+                                            </p:txEl>
+                                          </p:spTgt>
+                                        </p:tgtEl>
+                                        <p:attrNameLst>
+                                          <p:attrName>ppt_x</p:attrName>
+                                        </p:attrNameLst>
+                                      </p:cBhvr>
+                                      <p:tavLst>
+                                        <p:tav tm="0">
+                                          <p:val>
+                                            <p:strVal val="#ppt_x"/>
+                                          </p:val>
+                                        </p:tav>
+                                        <p:tav tm="100000">
+                                          <p:val>
+                                            <p:strVal val="#ppt_x"/>
+                                          </p:val>
+                                        </p:tav>
+                                      </p:tavLst>
+                                    </p:anim>
+                                    <p:anim calcmode="lin" valueType="num">
+                                      <p:cBhvr additive="base">
+                                        <p:cTn id="26" dur="500" fill="hold"/>
+                                        <p:tgtEl>
+                                          <p:spTgt spid="5">
+                                            <p:txEl>
+                                              <p:pRg st="3" end="3"/>
+                                            </p:txEl>
+                                          </p:spTgt>
+                                        </p:tgtEl>
+                                        <p:attrNameLst>
+                                          <p:attrName>ppt_y</p:attrName>
+                                        </p:attrNameLst>
+                                      </p:cBhvr>
+                                      <p:tavLst>
+                                        <p:tav tm="0">
+                                          <p:val>
+                                            <p:strVal val="1+#ppt_h/2"/>
+                                          </p:val>
+                                        </p:tav>
+                                        <p:tav tm="100000">
+                                          <p:val>
+                                            <p:strVal val="#ppt_y"/>
+                                          </p:val>
+                                        </p:tav>
+                                      </p:tavLst>
+                                    </p:anim>
+                                  </p:childTnLst>
+                                </p:cTn>
+                              </p:par>
+                            </p:childTnLst>
+                          </p:cTn>
+                        </p:par>
+                      </p:childTnLst>
+                    </p:cTn>
+                  </p:par>
+                  <p:par>
+                    <p:cTn id="27" fill="hold">
+                      <p:stCondLst>
+                        <p:cond delay="indefinite"/>
+                      </p:stCondLst>
+                      <p:childTnLst>
+                        <p:par>
+                          <p:cTn id="28" fill="hold">
+                            <p:stCondLst>
+                              <p:cond delay="0"/>
+                            </p:stCondLst>
+                            <p:childTnLst>
+                              <p:par>
+                                <p:cTn id="29" presetID="2" presetClass="entr" presetSubtype="4" fill="hold" grpId="0" nodeType="clickEffect">
+                                  <p:stCondLst>
+                                    <p:cond delay="0"/>
+                                  </p:stCondLst>
+                                  <p:childTnLst>
+                                    <p:set>
+                                      <p:cBhvr>
+                                        <p:cTn id="30" dur="1" fill="hold">
+                                          <p:stCondLst>
+                                            <p:cond delay="0"/>
+                                          </p:stCondLst>
+                                        </p:cTn>
+                                        <p:tgtEl>
+                                          <p:spTgt spid="5">
+                                            <p:txEl>
+                                              <p:pRg st="4" end="4"/>
+                                            </p:txEl>
+                                          </p:spTgt>
+                                        </p:tgtEl>
+                                        <p:attrNameLst>
+                                          <p:attrName>style.visibility</p:attrName>
+                                        </p:attrNameLst>
+                                      </p:cBhvr>
+                                      <p:to>
+                                        <p:strVal val="visible"/>
+                                      </p:to>
+                                    </p:set>
+                                    <p:anim calcmode="lin" valueType="num">
+                                      <p:cBhvr additive="base">
+                                        <p:cTn id="31" dur="500" fill="hold"/>
+                                        <p:tgtEl>
+                                          <p:spTgt spid="5">
+                                            <p:txEl>
+                                              <p:pRg st="4" end="4"/>
+                                            </p:txEl>
+                                          </p:spTgt>
+                                        </p:tgtEl>
+                                        <p:attrNameLst>
+                                          <p:attrName>ppt_x</p:attrName>
+                                        </p:attrNameLst>
+                                      </p:cBhvr>
+                                      <p:tavLst>
+                                        <p:tav tm="0">
+                                          <p:val>
+                                            <p:strVal val="#ppt_x"/>
+                                          </p:val>
+                                        </p:tav>
+                                        <p:tav tm="100000">
+                                          <p:val>
+                                            <p:strVal val="#ppt_x"/>
+                                          </p:val>
+                                        </p:tav>
+                                      </p:tavLst>
+                                    </p:anim>
+                                    <p:anim calcmode="lin" valueType="num">
+                                      <p:cBhvr additive="base">
+                                        <p:cTn id="32" dur="500" fill="hold"/>
+                                        <p:tgtEl>
+                                          <p:spTgt spid="5">
+                                            <p:txEl>
+                                              <p:pRg st="4" end="4"/>
+                                            </p:txEl>
+                                          </p:spTgt>
+                                        </p:tgtEl>
+                                        <p:attrNameLst>
+                                          <p:attrName>ppt_y</p:attrName>
+                                        </p:attrNameLst>
+                                      </p:cBhvr>
+                                      <p:tavLst>
+                                        <p:tav tm="0">
+                                          <p:val>
+                                            <p:strVal val="1+#ppt_h/2"/>
+                                          </p:val>
+                                        </p:tav>
+                                        <p:tav tm="100000">
+                                          <p:val>
+                                            <p:strVal val="#ppt_y"/>
+                                          </p:val>
+                                        </p:tav>
+                                      </p:tavLst>
+                                    </p:anim>
+                                  </p:childTnLst>
+                                </p:cTn>
+                              </p:par>
+                            </p:childTnLst>
+                          </p:cTn>
+                        </p:par>
+                      </p:childTnLst>
+                    </p:cTn>
+                  </p:par>
+                  <p:par>
+                    <p:cTn id="33" fill="hold">
+                      <p:stCondLst>
+                        <p:cond delay="indefinite"/>
+                      </p:stCondLst>
+                      <p:childTnLst>
+                        <p:par>
+                          <p:cTn id="34" fill="hold">
+                            <p:stCondLst>
+                              <p:cond delay="0"/>
+                            </p:stCondLst>
+                            <p:childTnLst>
+                              <p:par>
+                                <p:cTn id="35" presetID="2" presetClass="entr" presetSubtype="4" fill="hold" grpId="0" nodeType="clickEffect">
+                                  <p:stCondLst>
+                                    <p:cond delay="0"/>
+                                  </p:stCondLst>
+                                  <p:childTnLst>
+                                    <p:set>
+                                      <p:cBhvr>
+                                        <p:cTn id="36" dur="1" fill="hold">
+                                          <p:stCondLst>
+                                            <p:cond delay="0"/>
+                                          </p:stCondLst>
+                                        </p:cTn>
+                                        <p:tgtEl>
+                                          <p:spTgt spid="5">
+                                            <p:txEl>
+                                              <p:pRg st="5" end="5"/>
+                                            </p:txEl>
+                                          </p:spTgt>
+                                        </p:tgtEl>
+                                        <p:attrNameLst>
+                                          <p:attrName>style.visibility</p:attrName>
+                                        </p:attrNameLst>
+                                      </p:cBhvr>
+                                      <p:to>
+                                        <p:strVal val="visible"/>
+                                      </p:to>
+                                    </p:set>
+                                    <p:anim calcmode="lin" valueType="num">
+                                      <p:cBhvr additive="base">
+                                        <p:cTn id="37" dur="500" fill="hold"/>
+                                        <p:tgtEl>
+                                          <p:spTgt spid="5">
+                                            <p:txEl>
+                                              <p:pRg st="5" end="5"/>
+                                            </p:txEl>
+                                          </p:spTgt>
+                                        </p:tgtEl>
+                                        <p:attrNameLst>
+                                          <p:attrName>ppt_x</p:attrName>
+                                        </p:attrNameLst>
+                                      </p:cBhvr>
+                                      <p:tavLst>
+                                        <p:tav tm="0">
+                                          <p:val>
+                                            <p:strVal val="#ppt_x"/>
+                                          </p:val>
+                                        </p:tav>
+                                        <p:tav tm="100000">
+                                          <p:val>
+                                            <p:strVal val="#ppt_x"/>
+                                          </p:val>
+                                        </p:tav>
+                                      </p:tavLst>
+                                    </p:anim>
+                                    <p:anim calcmode="lin" valueType="num">
+                                      <p:cBhvr additive="base">
+                                        <p:cTn id="38" dur="500" fill="hold"/>
+                                        <p:tgtEl>
+                                          <p:spTgt spid="5">
+                                            <p:txEl>
+                                              <p:pRg st="5" end="5"/>
+                                            </p:txEl>
+                                          </p:spTgt>
+                                        </p:tgtEl>
+                                        <p:attrNameLst>
+                                          <p:attrName>ppt_y</p:attrName>
+                                        </p:attrNameLst>
+                                      </p:cBhvr>
+                                      <p:tavLst>
+                                        <p:tav tm="0">
+                                          <p:val>
+                                            <p:strVal val="1+#ppt_h/2"/>
+                                          </p:val>
+                                        </p:tav>
+                                        <p:tav tm="100000">
+                                          <p:val>
+                                            <p:strVal val="#ppt_y"/>
+                                          </p:val>
+                                        </p:tav>
+                                      </p:tavLst>
+                                    </p:anim>
+                                  </p:childTnLst>
+                                </p:cTn>
+                              </p:par>
+                            </p:childTnLst>
+                          </p:cTn>
+                        </p:par>
+                      </p:childTnLst>
+                    </p:cTn>
+                  </p:par>
+                  <p:par>
+                    <p:cTn id="39" fill="hold">
+                      <p:stCondLst>
+                        <p:cond delay="indefinite"/>
+                      </p:stCondLst>
+                      <p:childTnLst>
+                        <p:par>
+                          <p:cTn id="40" fill="hold">
+                            <p:stCondLst>
+                              <p:cond delay="0"/>
+                            </p:stCondLst>
+                            <p:childTnLst>
+                              <p:par>
+                                <p:cTn id="41" presetID="2" presetClass="entr" presetSubtype="4" fill="hold" grpId="0" nodeType="clickEffect">
+                                  <p:stCondLst>
+                                    <p:cond delay="0"/>
+                                  </p:stCondLst>
+                                  <p:childTnLst>
+                                    <p:set>
+                                      <p:cBhvr>
+                                        <p:cTn id="42" dur="1" fill="hold">
+                                          <p:stCondLst>
+                                            <p:cond delay="0"/>
+                                          </p:stCondLst>
+                                        </p:cTn>
+                                        <p:tgtEl>
+                                          <p:spTgt spid="5">
+                                            <p:txEl>
+                                              <p:pRg st="6" end="6"/>
+                                            </p:txEl>
+                                          </p:spTgt>
+                                        </p:tgtEl>
+                                        <p:attrNameLst>
+                                          <p:attrName>style.visibility</p:attrName>
+                                        </p:attrNameLst>
+                                      </p:cBhvr>
+                                      <p:to>
+                                        <p:strVal val="visible"/>
+                                      </p:to>
+                                    </p:set>
+                                    <p:anim calcmode="lin" valueType="num">
+                                      <p:cBhvr additive="base">
+                                        <p:cTn id="43" dur="500" fill="hold"/>
+                                        <p:tgtEl>
+                                          <p:spTgt spid="5">
+                                            <p:txEl>
+                                              <p:pRg st="6" end="6"/>
+                                            </p:txEl>
+                                          </p:spTgt>
+                                        </p:tgtEl>
+                                        <p:attrNameLst>
+                                          <p:attrName>ppt_x</p:attrName>
+                                        </p:attrNameLst>
+                                      </p:cBhvr>
+                                      <p:tavLst>
+                                        <p:tav tm="0">
+                                          <p:val>
+                                            <p:strVal val="#ppt_x"/>
+                                          </p:val>
+                                        </p:tav>
+                                        <p:tav tm="100000">
+                                          <p:val>
+                                            <p:strVal val="#ppt_x"/>
+                                          </p:val>
+                                        </p:tav>
+                                      </p:tavLst>
+                                    </p:anim>
+                                    <p:anim calcmode="lin" valueType="num">
+                                      <p:cBhvr additive="base">
+                                        <p:cTn id="44" dur="500" fill="hold"/>
+                                        <p:tgtEl>
+                                          <p:spTgt spid="5">
+                                            <p:txEl>
+                                              <p:pRg st="6" end="6"/>
+                                            </p:txEl>
+                                          </p:spTgt>
+                                        </p:tgtEl>
+                                        <p:attrNameLst>
+                                          <p:attrName>ppt_y</p:attrName>
+                                        </p:attrNameLst>
+                                      </p:cBhvr>
+                                      <p:tavLst>
+                                        <p:tav tm="0">
+                                          <p:val>
+                                            <p:strVal val="1+#ppt_h/2"/>
+                                          </p:val>
+                                        </p:tav>
+                                        <p:tav tm="100000">
+                                          <p:val>
+                                            <p:strVal val="#ppt_y"/>
+                                          </p:val>
+                                        </p:tav>
+                                      </p:tavLst>
+                                    </p:anim>
+                                  </p:childTnLst>
+                                </p:cTn>
+                              </p:par>
+                            </p:childTnLst>
+                          </p:cTn>
+                        </p:par>
+                      </p:childTnLst>
+                    </p:cTn>
+                  </p:par>
+                  <p:par>
+                    <p:cTn id="45" fill="hold">
+                      <p:stCondLst>
+                        <p:cond delay="indefinite"/>
+                      </p:stCondLst>
+                      <p:childTnLst>
+                        <p:par>
+                          <p:cTn id="46" fill="hold">
+                            <p:stCondLst>
+                              <p:cond delay="0"/>
+                            </p:stCondLst>
+                            <p:childTnLst>
+                              <p:par>
+                                <p:cTn id="47" presetID="2" presetClass="entr" presetSubtype="4" fill="hold" grpId="0" nodeType="clickEffect">
+                                  <p:stCondLst>
+                                    <p:cond delay="0"/>
+                                  </p:stCondLst>
+                                  <p:childTnLst>
+                                    <p:set>
+                                      <p:cBhvr>
+                                        <p:cTn id="48" dur="1" fill="hold">
+                                          <p:stCondLst>
+                                            <p:cond delay="0"/>
+                                          </p:stCondLst>
+                                        </p:cTn>
+                                        <p:tgtEl>
+                                          <p:spTgt spid="5">
+                                            <p:txEl>
+                                              <p:pRg st="7" end="7"/>
+                                            </p:txEl>
+                                          </p:spTgt>
+                                        </p:tgtEl>
+                                        <p:attrNameLst>
+                                          <p:attrName>style.visibility</p:attrName>
+                                        </p:attrNameLst>
+                                      </p:cBhvr>
+                                      <p:to>
+                                        <p:strVal val="visible"/>
+                                      </p:to>
+                                    </p:set>
+                                    <p:anim calcmode="lin" valueType="num">
+                                      <p:cBhvr additive="base">
+                                        <p:cTn id="49" dur="500" fill="hold"/>
+                                        <p:tgtEl>
+                                          <p:spTgt spid="5">
+                                            <p:txEl>
+                                              <p:pRg st="7" end="7"/>
+                                            </p:txEl>
+                                          </p:spTgt>
+                                        </p:tgtEl>
+                                        <p:attrNameLst>
+                                          <p:attrName>ppt_x</p:attrName>
+                                        </p:attrNameLst>
+                                      </p:cBhvr>
+                                      <p:tavLst>
+                                        <p:tav tm="0">
+                                          <p:val>
+                                            <p:strVal val="#ppt_x"/>
+                                          </p:val>
+                                        </p:tav>
+                                        <p:tav tm="100000">
+                                          <p:val>
+                                            <p:strVal val="#ppt_x"/>
+                                          </p:val>
+                                        </p:tav>
+                                      </p:tavLst>
+                                    </p:anim>
+                                    <p:anim calcmode="lin" valueType="num">
+                                      <p:cBhvr additive="base">
+                                        <p:cTn id="50" dur="500" fill="hold"/>
+                                        <p:tgtEl>
+                                          <p:spTgt spid="5">
+                                            <p:txEl>
+                                              <p:pRg st="7" end="7"/>
+                                            </p:txEl>
+                                          </p:spTgt>
+                                        </p:tgtEl>
+                                        <p:attrNameLst>
+                                          <p:attrName>ppt_y</p:attrName>
+                                        </p:attrNameLst>
+                                      </p:cBhvr>
+                                      <p:tavLst>
+                                        <p:tav tm="0">
+                                          <p:val>
+                                            <p:strVal val="1+#ppt_h/2"/>
+                                          </p:val>
+                                        </p:tav>
+                                        <p:tav tm="100000">
+                                          <p:val>
+                                            <p:strVal val="#ppt_y"/>
+                                          </p:val>
+                                        </p:tav>
+                                      </p:tavLst>
+                                    </p:anim>
+                                  </p:childTnLst>
+                                </p:cTn>
+                              </p:par>
+                            </p:childTnLst>
+                          </p:cTn>
+                        </p:par>
+                      </p:childTnLst>
+                    </p:cTn>
+                  </p:par>
+                  <p:par>
+                    <p:cTn id="51" fill="hold">
+                      <p:stCondLst>
+                        <p:cond delay="indefinite"/>
+                      </p:stCondLst>
+                      <p:childTnLst>
+                        <p:par>
+                          <p:cTn id="52" fill="hold">
+                            <p:stCondLst>
+                              <p:cond delay="0"/>
+                            </p:stCondLst>
+                            <p:childTnLst>
+                              <p:par>
+                                <p:cTn id="53" presetID="2" presetClass="entr" presetSubtype="4" fill="hold" grpId="0" nodeType="clickEffect">
+                                  <p:stCondLst>
+                                    <p:cond delay="0"/>
+                                  </p:stCondLst>
+                                  <p:childTnLst>
+                                    <p:set>
+                                      <p:cBhvr>
+                                        <p:cTn id="54" dur="1" fill="hold">
+                                          <p:stCondLst>
+                                            <p:cond delay="0"/>
+                                          </p:stCondLst>
+                                        </p:cTn>
+                                        <p:tgtEl>
+                                          <p:spTgt spid="5">
+                                            <p:txEl>
+                                              <p:pRg st="8" end="8"/>
+                                            </p:txEl>
+                                          </p:spTgt>
+                                        </p:tgtEl>
+                                        <p:attrNameLst>
+                                          <p:attrName>style.visibility</p:attrName>
+                                        </p:attrNameLst>
+                                      </p:cBhvr>
+                                      <p:to>
+                                        <p:strVal val="visible"/>
+                                      </p:to>
+                                    </p:set>
+                                    <p:anim calcmode="lin" valueType="num">
+                                      <p:cBhvr additive="base">
+                                        <p:cTn id="55" dur="500" fill="hold"/>
+                                        <p:tgtEl>
+                                          <p:spTgt spid="5">
+                                            <p:txEl>
+                                              <p:pRg st="8" end="8"/>
+                                            </p:txEl>
+                                          </p:spTgt>
+                                        </p:tgtEl>
+                                        <p:attrNameLst>
+                                          <p:attrName>ppt_x</p:attrName>
+                                        </p:attrNameLst>
+                                      </p:cBhvr>
+                                      <p:tavLst>
+                                        <p:tav tm="0">
+                                          <p:val>
+                                            <p:strVal val="#ppt_x"/>
+                                          </p:val>
+                                        </p:tav>
+                                        <p:tav tm="100000">
+                                          <p:val>
+                                            <p:strVal val="#ppt_x"/>
+                                          </p:val>
+                                        </p:tav>
+                                      </p:tavLst>
+                                    </p:anim>
+                                    <p:anim calcmode="lin" valueType="num">
+                                      <p:cBhvr additive="base">
+                                        <p:cTn id="56" dur="500" fill="hold"/>
+                                        <p:tgtEl>
+                                          <p:spTgt spid="5">
+                                            <p:txEl>
+                                              <p:pRg st="8" end="8"/>
+                                            </p:txEl>
+                                          </p:spTgt>
+                                        </p:tgtEl>
+                                        <p:attrNameLst>
+                                          <p:attrName>ppt_y</p:attrName>
+                                        </p:attrNameLst>
+                                      </p:cBhvr>
+                                      <p:tavLst>
+                                        <p:tav tm="0">
+                                          <p:val>
+                                            <p:strVal val="1+#ppt_h/2"/>
+                                          </p:val>
+                                        </p:tav>
+                                        <p:tav tm="100000">
+                                          <p:val>
+                                            <p:strVal val="#ppt_y"/>
+                                          </p:val>
+                                        </p:tav>
+                                      </p:tavLst>
+                                    </p:anim>
+                                  </p:childTnLst>
+                                </p:cTn>
+                              </p:par>
+                            </p:childTnLst>
+                          </p:cTn>
+                        </p:par>
+                      </p:childTnLst>
+                    </p:cTn>
+                  </p:par>
+                  <p:par>
+                    <p:cTn id="57" fill="hold">
+                      <p:stCondLst>
+                        <p:cond delay="indefinite"/>
+                      </p:stCondLst>
+                      <p:childTnLst>
+                        <p:par>
+                          <p:cTn id="58" fill="hold">
+                            <p:stCondLst>
+                              <p:cond delay="0"/>
+                            </p:stCondLst>
+                            <p:childTnLst>
+                              <p:par>
+                                <p:cTn id="59" presetID="2" presetClass="entr" presetSubtype="4" fill="hold" grpId="0" nodeType="clickEffect">
+                                  <p:stCondLst>
+                                    <p:cond delay="0"/>
+                                  </p:stCondLst>
+                                  <p:childTnLst>
+                                    <p:set>
+                                      <p:cBhvr>
+                                        <p:cTn id="60" dur="1" fill="hold">
+                                          <p:stCondLst>
+                                            <p:cond delay="0"/>
+                                          </p:stCondLst>
+                                        </p:cTn>
+                                        <p:tgtEl>
+                                          <p:spTgt spid="5">
+                                            <p:txEl>
+                                              <p:pRg st="9" end="9"/>
+                                            </p:txEl>
+                                          </p:spTgt>
+                                        </p:tgtEl>
+                                        <p:attrNameLst>
+                                          <p:attrName>style.visibility</p:attrName>
+                                        </p:attrNameLst>
+                                      </p:cBhvr>
+                                      <p:to>
+                                        <p:strVal val="visible"/>
+                                      </p:to>
+                                    </p:set>
+                                    <p:anim calcmode="lin" valueType="num">
+                                      <p:cBhvr additive="base">
+                                        <p:cTn id="61" dur="500" fill="hold"/>
+                                        <p:tgtEl>
+                                          <p:spTgt spid="5">
+                                            <p:txEl>
+                                              <p:pRg st="9" end="9"/>
+                                            </p:txEl>
+                                          </p:spTgt>
+                                        </p:tgtEl>
+                                        <p:attrNameLst>
+                                          <p:attrName>ppt_x</p:attrName>
+                                        </p:attrNameLst>
+                                      </p:cBhvr>
+                                      <p:tavLst>
+                                        <p:tav tm="0">
+                                          <p:val>
+                                            <p:strVal val="#ppt_x"/>
+                                          </p:val>
+                                        </p:tav>
+                                        <p:tav tm="100000">
+                                          <p:val>
+                                            <p:strVal val="#ppt_x"/>
+                                          </p:val>
+                                        </p:tav>
+                                      </p:tavLst>
+                                    </p:anim>
+                                    <p:anim calcmode="lin" valueType="num">
+                                      <p:cBhvr additive="base">
+                                        <p:cTn id="62" dur="500" fill="hold"/>
+                                        <p:tgtEl>
+                                          <p:spTgt spid="5">
+                                            <p:txEl>
+                                              <p:pRg st="9" end="9"/>
+                                            </p:txEl>
+                                          </p:spTgt>
+                                        </p:tgtEl>
+                                        <p:attrNameLst>
+                                          <p:attrName>ppt_y</p:attrName>
+                                        </p:attrNameLst>
+                                      </p:cBhvr>
+                                      <p:tavLst>
+                                        <p:tav tm="0">
+                                          <p:val>
+                                            <p:strVal val="1+#ppt_h/2"/>
+                                          </p:val>
+                                        </p:tav>
+                                        <p:tav tm="100000">
+                                          <p:val>
+                                            <p:strVal val="#ppt_y"/>
+                                          </p:val>
+                                        </p:tav>
+                                      </p:tavLst>
+                                    </p:anim>
+                                  </p:childTnLst>
+                                </p:cTn>
+                              </p:par>
+                            </p:childTnLst>
+                          </p:cTn>
+                        </p:par>
+                      </p:childTnLst>
+                    </p:cTn>
+                  </p:par>
+                  <p:par>
+                    <p:cTn id="63" fill="hold">
+                      <p:stCondLst>
+                        <p:cond delay="indefinite"/>
+                      </p:stCondLst>
+                      <p:childTnLst>
+                        <p:par>
+                          <p:cTn id="64" fill="hold">
+                            <p:stCondLst>
+                              <p:cond delay="0"/>
+                            </p:stCondLst>
+                            <p:childTnLst>
+                              <p:par>
+                                <p:cTn id="65" presetID="2" presetClass="entr" presetSubtype="4" fill="hold" grpId="0" nodeType="clickEffect">
+                                  <p:stCondLst>
+                                    <p:cond delay="0"/>
+                                  </p:stCondLst>
+                                  <p:childTnLst>
+                                    <p:set>
+                                      <p:cBhvr>
+                                        <p:cTn id="66" dur="1" fill="hold">
+                                          <p:stCondLst>
+                                            <p:cond delay="0"/>
+                                          </p:stCondLst>
+                                        </p:cTn>
+                                        <p:tgtEl>
+                                          <p:spTgt spid="5">
+                                            <p:txEl>
+                                              <p:pRg st="10" end="10"/>
+                                            </p:txEl>
+                                          </p:spTgt>
+                                        </p:tgtEl>
+                                        <p:attrNameLst>
+                                          <p:attrName>style.visibility</p:attrName>
+                                        </p:attrNameLst>
+                                      </p:cBhvr>
+                                      <p:to>
+                                        <p:strVal val="visible"/>
+                                      </p:to>
+                                    </p:set>
+                                    <p:anim calcmode="lin" valueType="num">
+                                      <p:cBhvr additive="base">
+                                        <p:cTn id="67" dur="500" fill="hold"/>
+                                        <p:tgtEl>
+                                          <p:spTgt spid="5">
+                                            <p:txEl>
+                                              <p:pRg st="10" end="10"/>
+                                            </p:txEl>
+                                          </p:spTgt>
+                                        </p:tgtEl>
+                                        <p:attrNameLst>
+                                          <p:attrName>ppt_x</p:attrName>
+                                        </p:attrNameLst>
+                                      </p:cBhvr>
+                                      <p:tavLst>
+                                        <p:tav tm="0">
+                                          <p:val>
+                                            <p:strVal val="#ppt_x"/>
+                                          </p:val>
+                                        </p:tav>
+                                        <p:tav tm="100000">
+                                          <p:val>
+                                            <p:strVal val="#ppt_x"/>
+                                          </p:val>
+                                        </p:tav>
+                                      </p:tavLst>
+                                    </p:anim>
+                                    <p:anim calcmode="lin" valueType="num">
+                                      <p:cBhvr additive="base">
+                                        <p:cTn id="68" dur="500" fill="hold"/>
+                                        <p:tgtEl>
+                                          <p:spTgt spid="5">
+                                            <p:txEl>
+                                              <p:pRg st="10" end="10"/>
+                                            </p:txEl>
+                                          </p:spTgt>
+                                        </p:tgtEl>
+                                        <p:attrNameLst>
+                                          <p:attrName>ppt_y</p:attrName>
+                                        </p:attrNameLst>
+                                      </p:cBhvr>
+                                      <p:tavLst>
+                                        <p:tav tm="0">
+                                          <p:val>
+                                            <p:strVal val="1+#ppt_h/2"/>
+                                          </p:val>
+                                        </p:tav>
+                                        <p:tav tm="100000">
+                                          <p:val>
+                                            <p:strVal val="#ppt_y"/>
+                                          </p:val>
+                                        </p:tav>
+                                      </p:tavLst>
+                                    </p:anim>
+                                  </p:childTnLst>
+                                </p:cTn>
+                              </p:par>
+                            </p:childTnLst>
+                          </p:cTn>
+                        </p:par>
+                      </p:childTnLst>
+                    </p:cTn>
+                  </p:par>
+                  <p:par>
+                    <p:cTn id="69" fill="hold">
+                      <p:stCondLst>
+                        <p:cond delay="indefinite"/>
+                      </p:stCondLst>
+                      <p:childTnLst>
+                        <p:par>
+                          <p:cTn id="70" fill="hold">
+                            <p:stCondLst>
+                              <p:cond delay="0"/>
+                            </p:stCondLst>
+                            <p:childTnLst>
+                              <p:par>
+                                <p:cTn id="71" presetID="2" presetClass="entr" presetSubtype="4" fill="hold" grpId="0" nodeType="clickEffect">
+                                  <p:stCondLst>
+                                    <p:cond delay="0"/>
+                                  </p:stCondLst>
+                                  <p:childTnLst>
+                                    <p:set>
+                                      <p:cBhvr>
+                                        <p:cTn id="72" dur="1" fill="hold">
+                                          <p:stCondLst>
+                                            <p:cond delay="0"/>
+                                          </p:stCondLst>
+                                        </p:cTn>
+                                        <p:tgtEl>
+                                          <p:spTgt spid="5">
+                                            <p:txEl>
+                                              <p:pRg st="11" end="11"/>
+                                            </p:txEl>
+                                          </p:spTgt>
+                                        </p:tgtEl>
+                                        <p:attrNameLst>
+                                          <p:attrName>style.visibility</p:attrName>
+                                        </p:attrNameLst>
+                                      </p:cBhvr>
+                                      <p:to>
+                                        <p:strVal val="visible"/>
+                                      </p:to>
+                                    </p:set>
+                                    <p:anim calcmode="lin" valueType="num">
+                                      <p:cBhvr additive="base">
+                                        <p:cTn id="73" dur="500" fill="hold"/>
+                                        <p:tgtEl>
+                                          <p:spTgt spid="5">
+                                            <p:txEl>
+                                              <p:pRg st="11" end="11"/>
+                                            </p:txEl>
+                                          </p:spTgt>
+                                        </p:tgtEl>
+                                        <p:attrNameLst>
+                                          <p:attrName>ppt_x</p:attrName>
+                                        </p:attrNameLst>
+                                      </p:cBhvr>
+                                      <p:tavLst>
+                                        <p:tav tm="0">
+                                          <p:val>
+                                            <p:strVal val="#ppt_x"/>
+                                          </p:val>
+                                        </p:tav>
+                                        <p:tav tm="100000">
+                                          <p:val>
+                                            <p:strVal val="#ppt_x"/>
+                                          </p:val>
+                                        </p:tav>
+                                      </p:tavLst>
+                                    </p:anim>
+                                    <p:anim calcmode="lin" valueType="num">
+                                      <p:cBhvr additive="base">
+                                        <p:cTn id="74" dur="500" fill="hold"/>
+                                        <p:tgtEl>
+                                          <p:spTgt spid="5">
+                                            <p:txEl>
+                                              <p:pRg st="11" end="11"/>
+                                            </p:txEl>
+                                          </p:spTgt>
+                                        </p:tgtEl>
+                                        <p:attrNameLst>
+                                          <p:attrName>ppt_y</p:attrName>
+                                        </p:attrNameLst>
+                                      </p:cBhvr>
+                                      <p:tavLst>
+                                        <p:tav tm="0">
+                                          <p:val>
+                                            <p:strVal val="1+#ppt_h/2"/>
+                                          </p:val>
+                                        </p:tav>
+                                        <p:tav tm="100000">
+                                          <p:val>
+                                            <p:strVal val="#ppt_y"/>
+                                          </p:val>
+                                        </p:tav>
+                                      </p:tavLst>
+                                    </p:anim>
+                                  </p:childTnLst>
+                                </p:cTn>
+                              </p:par>
+                            </p:childTnLst>
+                          </p:cTn>
+                        </p:par>
+                      </p:childTnLst>
+                    </p:cTn>
+                  </p:par>
+                </p:childTnLst>
+              </p:cTn>
+              <p:prevCondLst>
+                <p:cond evt="onPrev" delay="0">
+                  <p:tgtEl>
+                    <p:sldTgt/>
+                  </p:tgtEl>
+                </p:cond>
+              </p:prevCondLst>
+              <p:nextCondLst>
+                <p:cond evt="onNext" delay="0">
+                  <p:tgtEl>
+                    <p:sldTgt/>
+                  </p:tgtEl>
+                </p:cond>
+              </p:nextCondLst>
+            </p:seq>
+          </p:childTnLst>
+        </p:cTn>
+      </p:par>
+    </p:tnLst>
+    <p:bldLst>
+      <p:bldP spid="5" grpId="0" build="p"/>
+    </p:bldLst>
+  </p:timing>
 </p:sld>
 </file>
 

</xml_diff>